<commit_message>
remodeled sign up | communities not yet done
</commit_message>
<xml_diff>
--- a/Documentation/PowerPoint.pptx
+++ b/Documentation/PowerPoint.pptx
@@ -136,7 +136,18 @@
   </p:defaultTextStyle>
   <p:extLst>
     <p:ext uri="{EFAFB233-063F-42B5-8137-9DF3F51BA10A}">
-      <p15:sldGuideLst xmlns:p15="http://schemas.microsoft.com/office/powerpoint/2012/main" xmlns=""/>
+      <p15:sldGuideLst xmlns:p15="http://schemas.microsoft.com/office/powerpoint/2012/main">
+        <p15:guide id="1" orient="horz" pos="2160">
+          <p15:clr>
+            <a:srgbClr val="A4A3A4"/>
+          </p15:clr>
+        </p15:guide>
+        <p15:guide id="2" pos="2880">
+          <p15:clr>
+            <a:srgbClr val="A4A3A4"/>
+          </p15:clr>
+        </p15:guide>
+      </p15:sldGuideLst>
     </p:ext>
   </p:extLst>
 </p:presentation>
@@ -3755,13 +3766,7 @@
               <a:rPr lang="en-PH" dirty="0" smtClean="0">
                 <a:latin typeface="Century Gothic" panose="020B0502020202020204" pitchFamily="34" charset="0"/>
               </a:rPr>
-              <a:t>Nowadays</a:t>
-            </a:r>
-            <a:r>
-              <a:rPr lang="en-PH" dirty="0" smtClean="0">
-                <a:latin typeface="Century Gothic" panose="020B0502020202020204" pitchFamily="34" charset="0"/>
-              </a:rPr>
-              <a:t>, using gadgets such as mobile phones, tablets, and laptops etc. enables visitors to find websites anytime and anywhere given that internet connection is available. The researchers utilized frameworks like Python-Flask and </a:t>
+              <a:t>Nowadays, using gadgets such as mobile phones, tablets, and laptops etc. enables visitors to find websites anytime and anywhere given that internet connection is available. The researchers utilized frameworks like Python-Flask and </a:t>
             </a:r>
             <a:r>
               <a:rPr lang="en-PH" dirty="0" err="1" smtClean="0">
@@ -3890,19 +3895,7 @@
               <a:rPr lang="en-PH" dirty="0" smtClean="0">
                 <a:latin typeface="Century Gothic" panose="020B0502020202020204" pitchFamily="34" charset="0"/>
               </a:rPr>
-              <a:t>The </a:t>
-            </a:r>
-            <a:r>
-              <a:rPr lang="en-PH" dirty="0" smtClean="0">
-                <a:latin typeface="Century Gothic" panose="020B0502020202020204" pitchFamily="34" charset="0"/>
-              </a:rPr>
-              <a:t>proposed website will provide a list of partners and beneficiaries currently affiliated to </a:t>
-            </a:r>
-            <a:r>
-              <a:rPr lang="en-PH" dirty="0" smtClean="0">
-                <a:latin typeface="Century Gothic" panose="020B0502020202020204" pitchFamily="34" charset="0"/>
-              </a:rPr>
-              <a:t>SSCR-</a:t>
+              <a:t>The proposed website will provide a list of partners and beneficiaries currently affiliated to SSCR-</a:t>
             </a:r>
             <a:r>
               <a:rPr lang="en-PH" dirty="0" err="1" smtClean="0">
@@ -4242,13 +4235,7 @@
               <a:rPr lang="en-PH" b="1" dirty="0" smtClean="0">
                 <a:latin typeface="Century Gothic" panose="020B0502020202020204" pitchFamily="34" charset="0"/>
               </a:rPr>
-              <a:t>Advertisement</a:t>
-            </a:r>
-            <a:r>
-              <a:rPr lang="en-PH" b="1" dirty="0" smtClean="0">
-                <a:latin typeface="Century Gothic" panose="020B0502020202020204" pitchFamily="34" charset="0"/>
-              </a:rPr>
-              <a:t>.</a:t>
+              <a:t>Advertisement.</a:t>
             </a:r>
           </a:p>
           <a:p>
@@ -4375,13 +4362,7 @@
               <a:rPr lang="en-PH" b="1" dirty="0" smtClean="0">
                 <a:latin typeface="Century Gothic" panose="020B0502020202020204" pitchFamily="34" charset="0"/>
               </a:rPr>
-              <a:t>Approval</a:t>
-            </a:r>
-            <a:r>
-              <a:rPr lang="en-PH" b="1" dirty="0" smtClean="0">
-                <a:latin typeface="Century Gothic" panose="020B0502020202020204" pitchFamily="34" charset="0"/>
-              </a:rPr>
-              <a:t>.</a:t>
+              <a:t>Approval.</a:t>
             </a:r>
           </a:p>
           <a:p>
@@ -5314,12 +5295,16 @@
           <a:lstStyle/>
           <a:p>
             <a:r>
-              <a:rPr lang="en-US" b="1" dirty="0">
+              <a:rPr lang="en-US" b="1" dirty="0" smtClean="0">
                 <a:effectLst/>
                 <a:latin typeface="Century Gothic" panose="020B0502020202020204" pitchFamily="34" charset="0"/>
               </a:rPr>
-              <a:t>Partners and Linkages </a:t>
-            </a:r>
+              <a:t>Linkages </a:t>
+            </a:r>
+            <a:endParaRPr lang="en-US" b="1" dirty="0">
+              <a:effectLst/>
+              <a:latin typeface="Century Gothic" panose="020B0502020202020204" pitchFamily="34" charset="0"/>
+            </a:endParaRPr>
           </a:p>
           <a:p>
             <a:pPr marL="0" indent="0">
@@ -5330,14 +5315,28 @@
                 <a:effectLst/>
                 <a:latin typeface="Century Gothic" panose="020B0502020202020204" pitchFamily="34" charset="0"/>
               </a:rPr>
-              <a:t>	- partners </a:t>
+              <a:t>	</a:t>
+            </a:r>
+            <a:r>
+              <a:rPr lang="en-US" sz="2200" smtClean="0">
+                <a:effectLst/>
+                <a:latin typeface="Century Gothic" panose="020B0502020202020204" pitchFamily="34" charset="0"/>
+              </a:rPr>
+              <a:t>- </a:t>
+            </a:r>
+            <a:r>
+              <a:rPr lang="en-US" sz="2200" smtClean="0">
+                <a:effectLst/>
+                <a:latin typeface="Century Gothic" panose="020B0502020202020204" pitchFamily="34" charset="0"/>
+              </a:rPr>
+              <a:t>linkages </a:t>
             </a:r>
             <a:r>
               <a:rPr lang="en-US" sz="2200" dirty="0">
                 <a:effectLst/>
                 <a:latin typeface="Century Gothic" panose="020B0502020202020204" pitchFamily="34" charset="0"/>
               </a:rPr>
-              <a:t>and linkages of the website can do the following: </a:t>
+              <a:t>of the website can do the following: </a:t>
             </a:r>
             <a:endParaRPr lang="en-US" sz="2200" dirty="0" smtClean="0">
               <a:effectLst/>
@@ -5516,14 +5515,7 @@
                 <a:effectLst/>
                 <a:latin typeface="Century Gothic" panose="020B0502020202020204" pitchFamily="34" charset="0"/>
               </a:rPr>
-              <a:t>(</a:t>
-            </a:r>
-            <a:r>
-              <a:rPr lang="en-US" dirty="0" smtClean="0">
-                <a:effectLst/>
-                <a:latin typeface="Century Gothic" panose="020B0502020202020204" pitchFamily="34" charset="0"/>
-              </a:rPr>
-              <a:t>6) </a:t>
+              <a:t>(6) </a:t>
             </a:r>
             <a:r>
               <a:rPr lang="en-US" dirty="0">
@@ -6373,11 +6365,7 @@
             <a:pPr algn="ctr"/>
             <a:r>
               <a:rPr lang="en-US" sz="2400" dirty="0" smtClean="0"/>
-              <a:t>Hardware </a:t>
-            </a:r>
-            <a:r>
-              <a:rPr lang="en-US" sz="2400" dirty="0" smtClean="0"/>
-              <a:t>Development Tools</a:t>
+              <a:t>Hardware Development Tools</a:t>
             </a:r>
             <a:endParaRPr lang="en-US" sz="2400" dirty="0"/>
           </a:p>
@@ -6958,11 +6946,7 @@
             <a:pPr algn="ctr"/>
             <a:r>
               <a:rPr lang="en-US" sz="2400" dirty="0" smtClean="0"/>
-              <a:t>Software</a:t>
-            </a:r>
-            <a:r>
-              <a:rPr lang="en-US" sz="2400" dirty="0" smtClean="0"/>
-              <a:t> Development Tools</a:t>
+              <a:t>Software Development Tools</a:t>
             </a:r>
             <a:endParaRPr lang="en-US" sz="2400" dirty="0"/>
           </a:p>
@@ -7053,11 +7037,7 @@
             <a:pPr algn="ctr"/>
             <a:r>
               <a:rPr lang="en-US" sz="2400" dirty="0" smtClean="0"/>
-              <a:t>Hardware </a:t>
-            </a:r>
-            <a:r>
-              <a:rPr lang="en-US" sz="2400" dirty="0" smtClean="0"/>
-              <a:t>Requirements for Web</a:t>
+              <a:t>Hardware Requirements for Web</a:t>
             </a:r>
             <a:endParaRPr lang="en-US" sz="2400" dirty="0"/>
           </a:p>
@@ -7651,11 +7631,7 @@
             <a:pPr algn="ctr"/>
             <a:r>
               <a:rPr lang="en-US" sz="2400" dirty="0" smtClean="0"/>
-              <a:t>Software </a:t>
-            </a:r>
-            <a:r>
-              <a:rPr lang="en-US" sz="2400" dirty="0" smtClean="0"/>
-              <a:t>Requirements</a:t>
+              <a:t>Software Requirements</a:t>
             </a:r>
             <a:endParaRPr lang="en-US" sz="2400" dirty="0"/>
           </a:p>
@@ -11855,17 +11831,8 @@
               <a:rPr lang="en-US" sz="2400" dirty="0" smtClean="0">
                 <a:latin typeface="Century Gothic" panose="020B0502020202020204" pitchFamily="34" charset="0"/>
               </a:rPr>
-              <a:t>reoccurring instance of untracked and lost outreach proposal and records</a:t>
-            </a:r>
-            <a:r>
-              <a:rPr lang="en-US" sz="2400" dirty="0" smtClean="0">
-                <a:latin typeface="Century Gothic" panose="020B0502020202020204" pitchFamily="34" charset="0"/>
-              </a:rPr>
-              <a:t>.</a:t>
-            </a:r>
-            <a:endParaRPr lang="en-US" sz="2400" dirty="0" smtClean="0">
-              <a:latin typeface="Century Gothic" panose="020B0502020202020204" pitchFamily="34" charset="0"/>
-            </a:endParaRPr>
+              <a:t>reoccurring instance of untracked and lost outreach proposal and records.</a:t>
+            </a:r>
           </a:p>
           <a:p>
             <a:pPr>
@@ -11879,9 +11846,6 @@
               </a:rPr>
               <a:t>The limited number and information about linkages, communities and volunteers of outreach activities .</a:t>
             </a:r>
-            <a:endParaRPr lang="en-US" sz="2400" dirty="0" smtClean="0">
-              <a:latin typeface="Century Gothic" panose="020B0502020202020204" pitchFamily="34" charset="0"/>
-            </a:endParaRPr>
           </a:p>
           <a:p>
             <a:pPr>
@@ -12199,23 +12163,8 @@
               <a:rPr lang="en-US" dirty="0" smtClean="0">
                 <a:latin typeface="Century Gothic" panose="020B0502020202020204" pitchFamily="34" charset="0"/>
               </a:rPr>
-              <a:t>The </a:t>
-            </a:r>
-            <a:r>
-              <a:rPr lang="en-US" dirty="0" smtClean="0">
-                <a:latin typeface="Century Gothic" panose="020B0502020202020204" pitchFamily="34" charset="0"/>
-              </a:rPr>
-              <a:t>poor advertisement of outreach </a:t>
-            </a:r>
-            <a:r>
-              <a:rPr lang="en-US" dirty="0" smtClean="0">
-                <a:latin typeface="Century Gothic" panose="020B0502020202020204" pitchFamily="34" charset="0"/>
-              </a:rPr>
-              <a:t>programs . </a:t>
-            </a:r>
-            <a:endParaRPr lang="en-US" dirty="0" smtClean="0">
-              <a:latin typeface="Century Gothic" panose="020B0502020202020204" pitchFamily="34" charset="0"/>
-            </a:endParaRPr>
+              <a:t>The poor advertisement of outreach programs . </a:t>
+            </a:r>
           </a:p>
           <a:p>
             <a:pPr lvl="1">
@@ -12651,7 +12600,7 @@
   <a:extraClrSchemeLst/>
   <a:extLst>
     <a:ext uri="{05A4C25C-085E-4340-85A3-A5531E510DB2}">
-      <thm15:themeFamily xmlns:thm15="http://schemas.microsoft.com/office/thememl/2012/main" xmlns="" name="Office Theme" id="{62F939B6-93AF-4DB8-9C6B-D6C7DFDC589F}" vid="{4A3C46E8-61CC-4603-A589-7422A47A8E4A}"/>
+      <thm15:themeFamily xmlns:thm15="http://schemas.microsoft.com/office/thememl/2012/main" name="Office Theme" id="{62F939B6-93AF-4DB8-9C6B-D6C7DFDC589F}" vid="{4A3C46E8-61CC-4603-A589-7422A47A8E4A}"/>
     </a:ext>
   </a:extLst>
 </a:theme>

</xml_diff>